<commit_message>
Added a presentation slide
</commit_message>
<xml_diff>
--- a/Presentation Slides new.pptx
+++ b/Presentation Slides new.pptx
@@ -318,6 +318,11 @@
       </a:defRPr>
     </a:lvl9pPr>
   </p:defaultTextStyle>
+  <p:extLst>
+    <p:ext uri="{EFAFB233-063F-42B5-8137-9DF3F51BA10A}">
+      <p15:sldGuideLst xmlns:p15="http://schemas.microsoft.com/office/powerpoint/2012/main"/>
+    </p:ext>
+  </p:extLst>
 </p:presentation>
 </file>
 
@@ -1676,7 +1681,7 @@
           </a:ln>
           <a:extLst>
             <a:ext uri="{C572A759-6A51-4108-AA02-DFA0A04FC94B}">
-              <ma14:wrappingTextBoxFlag xmlns:ma14="http://schemas.microsoft.com/office/mac/drawingml/2011/main" xmlns:a14="http://schemas.microsoft.com/office/drawing/2010/main" xmlns:m="http://schemas.openxmlformats.org/officeDocument/2006/math" xmlns="" val="1"/>
+              <ma14:wrappingTextBoxFlag xmlns="" xmlns:m="http://schemas.openxmlformats.org/officeDocument/2006/math" xmlns:a14="http://schemas.microsoft.com/office/drawing/2010/main" xmlns:ma14="http://schemas.microsoft.com/office/mac/drawingml/2011/main" val="1"/>
             </a:ext>
           </a:extLst>
         </p:spPr>
@@ -1723,7 +1728,7 @@
           </a:ln>
           <a:extLst>
             <a:ext uri="{C572A759-6A51-4108-AA02-DFA0A04FC94B}">
-              <ma14:wrappingTextBoxFlag xmlns:ma14="http://schemas.microsoft.com/office/mac/drawingml/2011/main" xmlns:a14="http://schemas.microsoft.com/office/drawing/2010/main" xmlns:m="http://schemas.openxmlformats.org/officeDocument/2006/math" xmlns="" val="1"/>
+              <ma14:wrappingTextBoxFlag xmlns="" xmlns:m="http://schemas.openxmlformats.org/officeDocument/2006/math" xmlns:a14="http://schemas.microsoft.com/office/drawing/2010/main" xmlns:ma14="http://schemas.microsoft.com/office/mac/drawingml/2011/main" val="1"/>
             </a:ext>
           </a:extLst>
         </p:spPr>
@@ -2140,7 +2145,7 @@
           </a:ln>
           <a:extLst>
             <a:ext uri="{C572A759-6A51-4108-AA02-DFA0A04FC94B}">
-              <ma14:wrappingTextBoxFlag xmlns:ma14="http://schemas.microsoft.com/office/mac/drawingml/2011/main" xmlns:a14="http://schemas.microsoft.com/office/drawing/2010/main" xmlns:m="http://schemas.openxmlformats.org/officeDocument/2006/math" xmlns="" val="1"/>
+              <ma14:wrappingTextBoxFlag xmlns="" xmlns:m="http://schemas.openxmlformats.org/officeDocument/2006/math" xmlns:a14="http://schemas.microsoft.com/office/drawing/2010/main" xmlns:ma14="http://schemas.microsoft.com/office/mac/drawingml/2011/main" val="1"/>
             </a:ext>
           </a:extLst>
         </p:spPr>
@@ -2187,7 +2192,7 @@
           </a:ln>
           <a:extLst>
             <a:ext uri="{C572A759-6A51-4108-AA02-DFA0A04FC94B}">
-              <ma14:wrappingTextBoxFlag xmlns:ma14="http://schemas.microsoft.com/office/mac/drawingml/2011/main" xmlns:a14="http://schemas.microsoft.com/office/drawing/2010/main" xmlns:m="http://schemas.openxmlformats.org/officeDocument/2006/math" xmlns="" val="1"/>
+              <ma14:wrappingTextBoxFlag xmlns="" xmlns:m="http://schemas.openxmlformats.org/officeDocument/2006/math" xmlns:a14="http://schemas.microsoft.com/office/drawing/2010/main" xmlns:ma14="http://schemas.microsoft.com/office/mac/drawingml/2011/main" val="1"/>
             </a:ext>
           </a:extLst>
         </p:spPr>
@@ -4590,7 +4595,7 @@
           </a:ln>
           <a:extLst>
             <a:ext uri="{C572A759-6A51-4108-AA02-DFA0A04FC94B}">
-              <ma14:wrappingTextBoxFlag xmlns:ma14="http://schemas.microsoft.com/office/mac/drawingml/2011/main" xmlns:a14="http://schemas.microsoft.com/office/drawing/2010/main" xmlns:m="http://schemas.openxmlformats.org/officeDocument/2006/math" xmlns="" val="1"/>
+              <ma14:wrappingTextBoxFlag xmlns="" xmlns:m="http://schemas.openxmlformats.org/officeDocument/2006/math" xmlns:a14="http://schemas.microsoft.com/office/drawing/2010/main" xmlns:ma14="http://schemas.microsoft.com/office/mac/drawingml/2011/main" val="1"/>
             </a:ext>
           </a:extLst>
         </p:spPr>
@@ -4629,7 +4634,7 @@
           </a:ln>
           <a:extLst>
             <a:ext uri="{C572A759-6A51-4108-AA02-DFA0A04FC94B}">
-              <ma14:wrappingTextBoxFlag xmlns:ma14="http://schemas.microsoft.com/office/mac/drawingml/2011/main" xmlns:a14="http://schemas.microsoft.com/office/drawing/2010/main" xmlns:m="http://schemas.openxmlformats.org/officeDocument/2006/math" xmlns="" val="1"/>
+              <ma14:wrappingTextBoxFlag xmlns="" xmlns:m="http://schemas.openxmlformats.org/officeDocument/2006/math" xmlns:a14="http://schemas.microsoft.com/office/drawing/2010/main" xmlns:ma14="http://schemas.microsoft.com/office/mac/drawingml/2011/main" val="1"/>
             </a:ext>
           </a:extLst>
         </p:spPr>
@@ -6307,7 +6312,11 @@
           <a:bodyPr/>
           <a:lstStyle/>
           <a:p>
-            <a:endParaRPr/>
+            <a:r>
+              <a:rPr lang="en-US" dirty="0"/>
+              <a:t>Architecture Rationale</a:t>
+            </a:r>
+            <a:endParaRPr dirty="0"/>
           </a:p>
         </p:txBody>
       </p:sp>
@@ -6334,7 +6343,37 @@
           <a:bodyPr/>
           <a:lstStyle/>
           <a:p>
-            <a:endParaRPr/>
+            <a:r>
+              <a:rPr lang="en-SG" dirty="0"/>
+              <a:t>Low coupling, high cohesion</a:t>
+            </a:r>
+          </a:p>
+          <a:p>
+            <a:r>
+              <a:rPr lang="en-SG" dirty="0"/>
+              <a:t>Data flow and implicit invocation</a:t>
+            </a:r>
+          </a:p>
+          <a:p>
+            <a:pPr lvl="1"/>
+            <a:r>
+              <a:rPr lang="en-SG" dirty="0"/>
+              <a:t>Reliability</a:t>
+            </a:r>
+          </a:p>
+          <a:p>
+            <a:pPr lvl="1"/>
+            <a:r>
+              <a:rPr lang="en-SG" dirty="0"/>
+              <a:t>Flexibility</a:t>
+            </a:r>
+          </a:p>
+          <a:p>
+            <a:pPr lvl="1"/>
+            <a:r>
+              <a:rPr lang="en-SG"/>
+              <a:t>Reusability</a:t>
+            </a:r>
           </a:p>
         </p:txBody>
       </p:sp>

</xml_diff>

<commit_message>
Update on slides and diagrams
</commit_message>
<xml_diff>
--- a/Presentation Slides new.pptx
+++ b/Presentation Slides new.pptx
@@ -6069,10 +6069,10 @@
       </p:sp>
       <p:pic>
         <p:nvPicPr>
-          <p:cNvPr id="3" name="Picture 2" descr="A close up of a map&#10;&#10;Description automatically generated">
+          <p:cNvPr id="3" name="Picture 2" descr="A close up of text on a white background&#10;&#10;Description automatically generated">
             <a:extLst>
               <a:ext uri="{FF2B5EF4-FFF2-40B4-BE49-F238E27FC236}">
-                <a16:creationId xmlns:a16="http://schemas.microsoft.com/office/drawing/2014/main" id="{69E3CE5C-5072-4F57-B694-56324A6E9352}"/>
+                <a16:creationId xmlns:a16="http://schemas.microsoft.com/office/drawing/2014/main" id="{123C612D-0513-4C4F-B95C-B8A585111A2D}"/>
               </a:ext>
             </a:extLst>
           </p:cNvPr>
@@ -6095,8 +6095,8 @@
         </p:blipFill>
         <p:spPr>
           <a:xfrm>
-            <a:off x="1389431" y="1201751"/>
-            <a:ext cx="9413137" cy="5046649"/>
+            <a:off x="2122099" y="1573399"/>
+            <a:ext cx="7022958" cy="5060313"/>
           </a:xfrm>
           <a:prstGeom prst="rect">
             <a:avLst/>
@@ -6166,10 +6166,10 @@
       </p:sp>
       <p:pic>
         <p:nvPicPr>
-          <p:cNvPr id="3" name="Picture 2" descr="A screenshot of a cell phone&#10;&#10;Description automatically generated">
+          <p:cNvPr id="4" name="Picture 3" descr="A screenshot of a cell phone&#10;&#10;Description automatically generated">
             <a:extLst>
               <a:ext uri="{FF2B5EF4-FFF2-40B4-BE49-F238E27FC236}">
-                <a16:creationId xmlns:a16="http://schemas.microsoft.com/office/drawing/2014/main" id="{3C7E0098-2432-4263-B947-457857EC3A7E}"/>
+                <a16:creationId xmlns:a16="http://schemas.microsoft.com/office/drawing/2014/main" id="{FED8010C-628C-40B1-97DE-BA609639CB03}"/>
               </a:ext>
             </a:extLst>
           </p:cNvPr>
@@ -6192,8 +6192,8 @@
         </p:blipFill>
         <p:spPr>
           <a:xfrm>
-            <a:off x="956412" y="1713584"/>
-            <a:ext cx="9320555" cy="4318000"/>
+            <a:off x="677333" y="2076270"/>
+            <a:ext cx="10844684" cy="3895884"/>
           </a:xfrm>
           <a:prstGeom prst="rect">
             <a:avLst/>
@@ -6263,10 +6263,10 @@
       </p:sp>
       <p:pic>
         <p:nvPicPr>
-          <p:cNvPr id="3" name="Picture 2" descr="A picture containing screenshot&#10;&#10;Description automatically generated">
+          <p:cNvPr id="6" name="Picture 5" descr="A screenshot of a social media post&#10;&#10;Description automatically generated">
             <a:extLst>
               <a:ext uri="{FF2B5EF4-FFF2-40B4-BE49-F238E27FC236}">
-                <a16:creationId xmlns:a16="http://schemas.microsoft.com/office/drawing/2014/main" id="{876615DA-17AA-4F96-9930-799118819F18}"/>
+                <a16:creationId xmlns:a16="http://schemas.microsoft.com/office/drawing/2014/main" id="{3CF01297-CE06-4B07-9392-6CD0DAEABEFF}"/>
               </a:ext>
             </a:extLst>
           </p:cNvPr>
@@ -6289,8 +6289,8 @@
         </p:blipFill>
         <p:spPr>
           <a:xfrm>
-            <a:off x="1027521" y="1433308"/>
-            <a:ext cx="9784902" cy="5290621"/>
+            <a:off x="1078302" y="1828737"/>
+            <a:ext cx="10035396" cy="4410237"/>
           </a:xfrm>
           <a:prstGeom prst="rect">
             <a:avLst/>

</xml_diff>